<commit_message>
Chrome extension can now be placed in the chrome tab
The icon is now clickable, opens a UI with buttons.
</commit_message>
<xml_diff>
--- a/Spotify_Playlist_Enhancer_2.pptx
+++ b/Spotify_Playlist_Enhancer_2.pptx
@@ -14933,6 +14933,36 @@
           </a:p>
         </p:txBody>
       </p:sp>
+      <p:pic>
+        <p:nvPicPr>
+          <p:cNvPr id="8" name="Picture 7">
+            <a:extLst>
+              <a:ext uri="{FF2B5EF4-FFF2-40B4-BE49-F238E27FC236}">
+                <a16:creationId xmlns:a16="http://schemas.microsoft.com/office/drawing/2014/main" id="{A640D742-4464-F375-9069-6274EB19CC77}"/>
+              </a:ext>
+            </a:extLst>
+          </p:cNvPr>
+          <p:cNvPicPr>
+            <a:picLocks noChangeAspect="1"/>
+          </p:cNvPicPr>
+          <p:nvPr/>
+        </p:nvPicPr>
+        <p:blipFill>
+          <a:blip r:embed="rId3"/>
+          <a:stretch>
+            <a:fillRect/>
+          </a:stretch>
+        </p:blipFill>
+        <p:spPr>
+          <a:xfrm>
+            <a:off x="8123685" y="629417"/>
+            <a:ext cx="1538475" cy="1199383"/>
+          </a:xfrm>
+          <a:prstGeom prst="rect">
+            <a:avLst/>
+          </a:prstGeom>
+        </p:spPr>
+      </p:pic>
     </p:spTree>
     <p:extLst>
       <p:ext uri="{BB962C8B-B14F-4D97-AF65-F5344CB8AC3E}">

</xml_diff>

<commit_message>
The chrome extension now has 3 spotify themed buttons
</commit_message>
<xml_diff>
--- a/Spotify_Playlist_Enhancer_2.pptx
+++ b/Spotify_Playlist_Enhancer_2.pptx
@@ -14449,8 +14449,8 @@
         </p:blipFill>
         <p:spPr>
           <a:xfrm>
-            <a:off x="5142960" y="629417"/>
-            <a:ext cx="4307533" cy="2982966"/>
+            <a:off x="4288681" y="565917"/>
+            <a:ext cx="4078079" cy="2824069"/>
           </a:xfrm>
           <a:prstGeom prst="rect">
             <a:avLst/>
@@ -14955,8 +14955,38 @@
         </p:blipFill>
         <p:spPr>
           <a:xfrm>
-            <a:off x="8123685" y="629417"/>
+            <a:off x="6063058" y="3807208"/>
             <a:ext cx="1538475" cy="1199383"/>
+          </a:xfrm>
+          <a:prstGeom prst="rect">
+            <a:avLst/>
+          </a:prstGeom>
+        </p:spPr>
+      </p:pic>
+      <p:pic>
+        <p:nvPicPr>
+          <p:cNvPr id="9" name="Picture 8">
+            <a:extLst>
+              <a:ext uri="{FF2B5EF4-FFF2-40B4-BE49-F238E27FC236}">
+                <a16:creationId xmlns:a16="http://schemas.microsoft.com/office/drawing/2014/main" id="{FDAB1234-081B-7BD1-E8CE-97C821FCB7DF}"/>
+              </a:ext>
+            </a:extLst>
+          </p:cNvPr>
+          <p:cNvPicPr>
+            <a:picLocks noChangeAspect="1"/>
+          </p:cNvPicPr>
+          <p:nvPr/>
+        </p:nvPicPr>
+        <p:blipFill>
+          <a:blip r:embed="rId4"/>
+          <a:stretch>
+            <a:fillRect/>
+          </a:stretch>
+        </p:blipFill>
+        <p:spPr>
+          <a:xfrm>
+            <a:off x="8284495" y="3620258"/>
+            <a:ext cx="2153317" cy="2034037"/>
           </a:xfrm>
           <a:prstGeom prst="rect">
             <a:avLst/>

</xml_diff>

<commit_message>
Added some new logos to repository and changed the extension logo
</commit_message>
<xml_diff>
--- a/Spotify_Playlist_Enhancer_2.pptx
+++ b/Spotify_Playlist_Enhancer_2.pptx
@@ -10,6 +10,8 @@
     <p:sldId id="257" r:id="rId4"/>
     <p:sldId id="259" r:id="rId5"/>
     <p:sldId id="260" r:id="rId6"/>
+    <p:sldId id="262" r:id="rId7"/>
+    <p:sldId id="261" r:id="rId8"/>
   </p:sldIdLst>
   <p:sldSz cx="12192000" cy="6858000"/>
   <p:notesSz cx="6858000" cy="9144000"/>
@@ -14401,8 +14403,8 @@
         </p:nvSpPr>
         <p:spPr>
           <a:xfrm>
-            <a:off x="1154955" y="973668"/>
-            <a:ext cx="2942210" cy="1020232"/>
+            <a:off x="476353" y="384431"/>
+            <a:ext cx="3989747" cy="1020232"/>
           </a:xfrm>
         </p:spPr>
         <p:txBody>
@@ -14417,46 +14419,24 @@
               </a:lnSpc>
             </a:pPr>
             <a:r>
-              <a:rPr lang="en-IE" sz="3300">
+              <a:rPr lang="en-IE" sz="2400" dirty="0" err="1">
                 <a:solidFill>
                   <a:srgbClr val="EBEBEB"/>
                 </a:solidFill>
               </a:rPr>
-              <a:t>Jevgenij’s work</a:t>
+              <a:t>Jevgenij’s</a:t>
+            </a:r>
+            <a:r>
+              <a:rPr lang="en-IE" sz="2400" dirty="0">
+                <a:solidFill>
+                  <a:srgbClr val="EBEBEB"/>
+                </a:solidFill>
+              </a:rPr>
+              <a:t> contributions</a:t>
             </a:r>
           </a:p>
         </p:txBody>
       </p:sp>
-      <p:pic>
-        <p:nvPicPr>
-          <p:cNvPr id="5" name="Picture 4">
-            <a:extLst>
-              <a:ext uri="{FF2B5EF4-FFF2-40B4-BE49-F238E27FC236}">
-                <a16:creationId xmlns:a16="http://schemas.microsoft.com/office/drawing/2014/main" id="{5286841F-8143-D917-9FC6-10D7BA04019D}"/>
-              </a:ext>
-            </a:extLst>
-          </p:cNvPr>
-          <p:cNvPicPr>
-            <a:picLocks noChangeAspect="1"/>
-          </p:cNvPicPr>
-          <p:nvPr/>
-        </p:nvPicPr>
-        <p:blipFill>
-          <a:blip r:embed="rId2"/>
-          <a:stretch>
-            <a:fillRect/>
-          </a:stretch>
-        </p:blipFill>
-        <p:spPr>
-          <a:xfrm>
-            <a:off x="4288681" y="565917"/>
-            <a:ext cx="4078079" cy="2824069"/>
-          </a:xfrm>
-          <a:prstGeom prst="rect">
-            <a:avLst/>
-          </a:prstGeom>
-        </p:spPr>
-      </p:pic>
       <p:sp>
         <p:nvSpPr>
           <p:cNvPr id="16" name="Rectangle 15">
@@ -14691,7 +14671,7 @@
         </p:nvSpPr>
         <p:spPr>
           <a:xfrm>
-            <a:off x="1154955" y="2120900"/>
+            <a:off x="531019" y="1295400"/>
             <a:ext cx="3133726" cy="3898900"/>
           </a:xfrm>
         </p:spPr>
@@ -14712,7 +14692,37 @@
                   <a:srgbClr val="FFFFFF"/>
                 </a:solidFill>
               </a:rPr>
-              <a:t>Created Google Chrome extension compatibility with React App. The app now appears in the list of Chrome Extensions</a:t>
+              <a:t>Created a Google Chrome extension.</a:t>
+            </a:r>
+          </a:p>
+          <a:p>
+            <a:pPr lvl="1">
+              <a:lnSpc>
+                <a:spcPct val="90000"/>
+              </a:lnSpc>
+            </a:pPr>
+            <a:r>
+              <a:rPr lang="en-IE" sz="1300" dirty="0">
+                <a:solidFill>
+                  <a:srgbClr val="FFFFFF"/>
+                </a:solidFill>
+              </a:rPr>
+              <a:t>Ensured the extension loads into your Chrome browser.</a:t>
+            </a:r>
+          </a:p>
+          <a:p>
+            <a:pPr lvl="1">
+              <a:lnSpc>
+                <a:spcPct val="90000"/>
+              </a:lnSpc>
+            </a:pPr>
+            <a:r>
+              <a:rPr lang="en-IE" sz="1300" dirty="0">
+                <a:solidFill>
+                  <a:srgbClr val="FFFFFF"/>
+                </a:solidFill>
+              </a:rPr>
+              <a:t>The extension has a unique Spotify icon and can be pinned into Chrome panel.</a:t>
             </a:r>
           </a:p>
           <a:p>
@@ -14751,14 +14761,23 @@
                 <a:spcPct val="90000"/>
               </a:lnSpc>
             </a:pPr>
-            <a:r>
-              <a:rPr lang="en-IE" sz="1500" dirty="0">
-                <a:solidFill>
-                  <a:srgbClr val="FFFFFF"/>
-                </a:solidFill>
-              </a:rPr>
-              <a:t>-</a:t>
-            </a:r>
+            <a:endParaRPr lang="en-IE" sz="1500" dirty="0">
+              <a:solidFill>
+                <a:srgbClr val="FFFFFF"/>
+              </a:solidFill>
+            </a:endParaRPr>
+          </a:p>
+          <a:p>
+            <a:pPr>
+              <a:lnSpc>
+                <a:spcPct val="90000"/>
+              </a:lnSpc>
+            </a:pPr>
+            <a:endParaRPr lang="en-IE" sz="1500" dirty="0">
+              <a:solidFill>
+                <a:srgbClr val="FFFFFF"/>
+              </a:solidFill>
+            </a:endParaRPr>
           </a:p>
         </p:txBody>
       </p:sp>
@@ -14935,10 +14954,40 @@
       </p:sp>
       <p:pic>
         <p:nvPicPr>
-          <p:cNvPr id="8" name="Picture 7">
+          <p:cNvPr id="6" name="Picture 5">
             <a:extLst>
               <a:ext uri="{FF2B5EF4-FFF2-40B4-BE49-F238E27FC236}">
-                <a16:creationId xmlns:a16="http://schemas.microsoft.com/office/drawing/2014/main" id="{A640D742-4464-F375-9069-6274EB19CC77}"/>
+                <a16:creationId xmlns:a16="http://schemas.microsoft.com/office/drawing/2014/main" id="{A977A5A0-57BA-0693-EB89-EB304FCE5D02}"/>
+              </a:ext>
+            </a:extLst>
+          </p:cNvPr>
+          <p:cNvPicPr>
+            <a:picLocks noChangeAspect="1"/>
+          </p:cNvPicPr>
+          <p:nvPr/>
+        </p:nvPicPr>
+        <p:blipFill>
+          <a:blip r:embed="rId2"/>
+          <a:stretch>
+            <a:fillRect/>
+          </a:stretch>
+        </p:blipFill>
+        <p:spPr>
+          <a:xfrm>
+            <a:off x="4301526" y="159410"/>
+            <a:ext cx="4267930" cy="3058683"/>
+          </a:xfrm>
+          <a:prstGeom prst="rect">
+            <a:avLst/>
+          </a:prstGeom>
+        </p:spPr>
+      </p:pic>
+      <p:pic>
+        <p:nvPicPr>
+          <p:cNvPr id="11" name="Picture 10">
+            <a:extLst>
+              <a:ext uri="{FF2B5EF4-FFF2-40B4-BE49-F238E27FC236}">
+                <a16:creationId xmlns:a16="http://schemas.microsoft.com/office/drawing/2014/main" id="{C91F09EA-4D24-2146-33A0-F2DD9F433E49}"/>
               </a:ext>
             </a:extLst>
           </p:cNvPr>
@@ -14955,8 +15004,8 @@
         </p:blipFill>
         <p:spPr>
           <a:xfrm>
-            <a:off x="6063058" y="3807208"/>
-            <a:ext cx="1538475" cy="1199383"/>
+            <a:off x="8732289" y="159410"/>
+            <a:ext cx="1815588" cy="1096917"/>
           </a:xfrm>
           <a:prstGeom prst="rect">
             <a:avLst/>
@@ -14965,10 +15014,10 @@
       </p:pic>
       <p:pic>
         <p:nvPicPr>
-          <p:cNvPr id="9" name="Picture 8">
+          <p:cNvPr id="15" name="Picture 14">
             <a:extLst>
               <a:ext uri="{FF2B5EF4-FFF2-40B4-BE49-F238E27FC236}">
-                <a16:creationId xmlns:a16="http://schemas.microsoft.com/office/drawing/2014/main" id="{FDAB1234-081B-7BD1-E8CE-97C821FCB7DF}"/>
+                <a16:creationId xmlns:a16="http://schemas.microsoft.com/office/drawing/2014/main" id="{61C55317-9FB4-777B-8309-1FF01F6BBC7D}"/>
               </a:ext>
             </a:extLst>
           </p:cNvPr>
@@ -14985,8 +15034,8 @@
         </p:blipFill>
         <p:spPr>
           <a:xfrm>
-            <a:off x="8284495" y="3620258"/>
-            <a:ext cx="2153317" cy="2034037"/>
+            <a:off x="8841226" y="1499081"/>
+            <a:ext cx="2379827" cy="2094248"/>
           </a:xfrm>
           <a:prstGeom prst="rect">
             <a:avLst/>
@@ -15002,6 +15051,166 @@
   </p:cSld>
   <p:clrMapOvr>
     <a:overrideClrMapping bg1="dk1" tx1="lt1" bg2="dk2" tx2="lt2" accent1="accent1" accent2="accent2" accent3="accent3" accent4="accent4" accent5="accent5" accent6="accent6" hlink="hlink" folHlink="folHlink"/>
+  </p:clrMapOvr>
+</p:sld>
+</file>
+
+<file path=ppt/slides/slide6.xml><?xml version="1.0" encoding="utf-8"?>
+<p:sld xmlns:a="http://schemas.openxmlformats.org/drawingml/2006/main" xmlns:r="http://schemas.openxmlformats.org/officeDocument/2006/relationships" xmlns:p="http://schemas.openxmlformats.org/presentationml/2006/main">
+  <p:cSld>
+    <p:spTree>
+      <p:nvGrpSpPr>
+        <p:cNvPr id="1" name=""/>
+        <p:cNvGrpSpPr/>
+        <p:nvPr/>
+      </p:nvGrpSpPr>
+      <p:grpSpPr>
+        <a:xfrm>
+          <a:off x="0" y="0"/>
+          <a:ext cx="0" cy="0"/>
+          <a:chOff x="0" y="0"/>
+          <a:chExt cx="0" cy="0"/>
+        </a:xfrm>
+      </p:grpSpPr>
+      <p:sp>
+        <p:nvSpPr>
+          <p:cNvPr id="2" name="Title 1">
+            <a:extLst>
+              <a:ext uri="{FF2B5EF4-FFF2-40B4-BE49-F238E27FC236}">
+                <a16:creationId xmlns:a16="http://schemas.microsoft.com/office/drawing/2014/main" id="{AB33B860-54CD-7159-F9FD-EDBD14348800}"/>
+              </a:ext>
+            </a:extLst>
+          </p:cNvPr>
+          <p:cNvSpPr>
+            <a:spLocks noGrp="1"/>
+          </p:cNvSpPr>
+          <p:nvPr>
+            <p:ph type="title"/>
+          </p:nvPr>
+        </p:nvSpPr>
+        <p:spPr/>
+        <p:txBody>
+          <a:bodyPr/>
+          <a:lstStyle/>
+          <a:p>
+            <a:endParaRPr lang="en-IE"/>
+          </a:p>
+        </p:txBody>
+      </p:sp>
+      <p:sp>
+        <p:nvSpPr>
+          <p:cNvPr id="3" name="Content Placeholder 2">
+            <a:extLst>
+              <a:ext uri="{FF2B5EF4-FFF2-40B4-BE49-F238E27FC236}">
+                <a16:creationId xmlns:a16="http://schemas.microsoft.com/office/drawing/2014/main" id="{4F2648ED-AEEB-4856-0232-1086B8080104}"/>
+              </a:ext>
+            </a:extLst>
+          </p:cNvPr>
+          <p:cNvSpPr>
+            <a:spLocks noGrp="1"/>
+          </p:cNvSpPr>
+          <p:nvPr>
+            <p:ph idx="1"/>
+          </p:nvPr>
+        </p:nvSpPr>
+        <p:spPr/>
+        <p:txBody>
+          <a:bodyPr/>
+          <a:lstStyle/>
+          <a:p>
+            <a:endParaRPr lang="en-IE"/>
+          </a:p>
+        </p:txBody>
+      </p:sp>
+    </p:spTree>
+    <p:extLst>
+      <p:ext uri="{BB962C8B-B14F-4D97-AF65-F5344CB8AC3E}">
+        <p14:creationId xmlns:p14="http://schemas.microsoft.com/office/powerpoint/2010/main" val="1098089808"/>
+      </p:ext>
+    </p:extLst>
+  </p:cSld>
+  <p:clrMapOvr>
+    <a:masterClrMapping/>
+  </p:clrMapOvr>
+</p:sld>
+</file>
+
+<file path=ppt/slides/slide7.xml><?xml version="1.0" encoding="utf-8"?>
+<p:sld xmlns:a="http://schemas.openxmlformats.org/drawingml/2006/main" xmlns:r="http://schemas.openxmlformats.org/officeDocument/2006/relationships" xmlns:p="http://schemas.openxmlformats.org/presentationml/2006/main">
+  <p:cSld>
+    <p:spTree>
+      <p:nvGrpSpPr>
+        <p:cNvPr id="1" name=""/>
+        <p:cNvGrpSpPr/>
+        <p:nvPr/>
+      </p:nvGrpSpPr>
+      <p:grpSpPr>
+        <a:xfrm>
+          <a:off x="0" y="0"/>
+          <a:ext cx="0" cy="0"/>
+          <a:chOff x="0" y="0"/>
+          <a:chExt cx="0" cy="0"/>
+        </a:xfrm>
+      </p:grpSpPr>
+      <p:sp>
+        <p:nvSpPr>
+          <p:cNvPr id="2" name="Title 1">
+            <a:extLst>
+              <a:ext uri="{FF2B5EF4-FFF2-40B4-BE49-F238E27FC236}">
+                <a16:creationId xmlns:a16="http://schemas.microsoft.com/office/drawing/2014/main" id="{8FF0293E-3403-289B-3ED9-011C09ED98B6}"/>
+              </a:ext>
+            </a:extLst>
+          </p:cNvPr>
+          <p:cNvSpPr>
+            <a:spLocks noGrp="1"/>
+          </p:cNvSpPr>
+          <p:nvPr>
+            <p:ph type="title"/>
+          </p:nvPr>
+        </p:nvSpPr>
+        <p:spPr/>
+        <p:txBody>
+          <a:bodyPr/>
+          <a:lstStyle/>
+          <a:p>
+            <a:endParaRPr lang="en-IE"/>
+          </a:p>
+        </p:txBody>
+      </p:sp>
+      <p:sp>
+        <p:nvSpPr>
+          <p:cNvPr id="3" name="Content Placeholder 2">
+            <a:extLst>
+              <a:ext uri="{FF2B5EF4-FFF2-40B4-BE49-F238E27FC236}">
+                <a16:creationId xmlns:a16="http://schemas.microsoft.com/office/drawing/2014/main" id="{D6B510C4-A411-1AFD-CD21-A7DBFF70F3E4}"/>
+              </a:ext>
+            </a:extLst>
+          </p:cNvPr>
+          <p:cNvSpPr>
+            <a:spLocks noGrp="1"/>
+          </p:cNvSpPr>
+          <p:nvPr>
+            <p:ph idx="1"/>
+          </p:nvPr>
+        </p:nvSpPr>
+        <p:spPr/>
+        <p:txBody>
+          <a:bodyPr/>
+          <a:lstStyle/>
+          <a:p>
+            <a:endParaRPr lang="en-IE"/>
+          </a:p>
+        </p:txBody>
+      </p:sp>
+    </p:spTree>
+    <p:extLst>
+      <p:ext uri="{BB962C8B-B14F-4D97-AF65-F5344CB8AC3E}">
+        <p14:creationId xmlns:p14="http://schemas.microsoft.com/office/powerpoint/2010/main" val="4173159937"/>
+      </p:ext>
+    </p:extLst>
+  </p:cSld>
+  <p:clrMapOvr>
+    <a:masterClrMapping/>
   </p:clrMapOvr>
 </p:sld>
 </file>

</xml_diff>

<commit_message>
Added login.html and .css for login and registration page
The extension now also redirects the user to the login page when licked
</commit_message>
<xml_diff>
--- a/Spotify_Playlist_Enhancer_2.pptx
+++ b/Spotify_Playlist_Enhancer_2.pptx
@@ -10,8 +10,6 @@
     <p:sldId id="257" r:id="rId4"/>
     <p:sldId id="259" r:id="rId5"/>
     <p:sldId id="260" r:id="rId6"/>
-    <p:sldId id="262" r:id="rId7"/>
-    <p:sldId id="261" r:id="rId8"/>
   </p:sldIdLst>
   <p:sldSz cx="12192000" cy="6858000"/>
   <p:notesSz cx="6858000" cy="9144000"/>
@@ -14671,8 +14669,8 @@
         </p:nvSpPr>
         <p:spPr>
           <a:xfrm>
-            <a:off x="531019" y="1295400"/>
-            <a:ext cx="3133726" cy="3898900"/>
+            <a:off x="528636" y="1295400"/>
+            <a:ext cx="3853879" cy="3898900"/>
           </a:xfrm>
         </p:spPr>
         <p:txBody>
@@ -14707,7 +14705,7 @@
                   <a:srgbClr val="FFFFFF"/>
                 </a:solidFill>
               </a:rPr>
-              <a:t>Ensured the extension loads into your Chrome browser.</a:t>
+              <a:t>Ensured the extension loads into your Chrome browser correctly.</a:t>
             </a:r>
           </a:p>
           <a:p>
@@ -14722,7 +14720,22 @@
                   <a:srgbClr val="FFFFFF"/>
                 </a:solidFill>
               </a:rPr>
-              <a:t>The extension has a unique Spotify icon and can be pinned into Chrome panel.</a:t>
+              <a:t>The extension has a unique Spotify icon and Spotify themed buttons. Can also be pinned into Chrome panel.</a:t>
+            </a:r>
+          </a:p>
+          <a:p>
+            <a:pPr lvl="1">
+              <a:lnSpc>
+                <a:spcPct val="90000"/>
+              </a:lnSpc>
+            </a:pPr>
+            <a:r>
+              <a:rPr lang="en-IE" sz="1300" dirty="0">
+                <a:solidFill>
+                  <a:srgbClr val="FFFFFF"/>
+                </a:solidFill>
+              </a:rPr>
+              <a:t>The first button opens a new tab in your Chrome browser. For now it’s a placeholder for our Playlist Web API.</a:t>
             </a:r>
           </a:p>
           <a:p>
@@ -14954,10 +14967,10 @@
       </p:sp>
       <p:pic>
         <p:nvPicPr>
-          <p:cNvPr id="6" name="Picture 5">
+          <p:cNvPr id="5" name="Picture 4">
             <a:extLst>
               <a:ext uri="{FF2B5EF4-FFF2-40B4-BE49-F238E27FC236}">
-                <a16:creationId xmlns:a16="http://schemas.microsoft.com/office/drawing/2014/main" id="{A977A5A0-57BA-0693-EB89-EB304FCE5D02}"/>
+                <a16:creationId xmlns:a16="http://schemas.microsoft.com/office/drawing/2014/main" id="{CD928EAA-D068-DB56-9B01-F889A99A5352}"/>
               </a:ext>
             </a:extLst>
           </p:cNvPr>
@@ -14974,8 +14987,8 @@
         </p:blipFill>
         <p:spPr>
           <a:xfrm>
-            <a:off x="4301526" y="159410"/>
-            <a:ext cx="4267930" cy="3058683"/>
+            <a:off x="4232357" y="159410"/>
+            <a:ext cx="4419639" cy="2883044"/>
           </a:xfrm>
           <a:prstGeom prst="rect">
             <a:avLst/>
@@ -14984,10 +14997,10 @@
       </p:pic>
       <p:pic>
         <p:nvPicPr>
-          <p:cNvPr id="11" name="Picture 10">
+          <p:cNvPr id="8" name="Picture 7">
             <a:extLst>
               <a:ext uri="{FF2B5EF4-FFF2-40B4-BE49-F238E27FC236}">
-                <a16:creationId xmlns:a16="http://schemas.microsoft.com/office/drawing/2014/main" id="{C91F09EA-4D24-2146-33A0-F2DD9F433E49}"/>
+                <a16:creationId xmlns:a16="http://schemas.microsoft.com/office/drawing/2014/main" id="{D6799B49-23A1-F1C8-387C-6F8C950DC48E}"/>
               </a:ext>
             </a:extLst>
           </p:cNvPr>
@@ -15004,8 +15017,8 @@
         </p:blipFill>
         <p:spPr>
           <a:xfrm>
-            <a:off x="8732289" y="159410"/>
-            <a:ext cx="1815588" cy="1096917"/>
+            <a:off x="8760822" y="137061"/>
+            <a:ext cx="2438473" cy="1197846"/>
           </a:xfrm>
           <a:prstGeom prst="rect">
             <a:avLst/>
@@ -15014,10 +15027,10 @@
       </p:pic>
       <p:pic>
         <p:nvPicPr>
-          <p:cNvPr id="15" name="Picture 14">
+          <p:cNvPr id="13" name="Picture 12">
             <a:extLst>
               <a:ext uri="{FF2B5EF4-FFF2-40B4-BE49-F238E27FC236}">
-                <a16:creationId xmlns:a16="http://schemas.microsoft.com/office/drawing/2014/main" id="{61C55317-9FB4-777B-8309-1FF01F6BBC7D}"/>
+                <a16:creationId xmlns:a16="http://schemas.microsoft.com/office/drawing/2014/main" id="{990DF9A0-96D0-0E30-0DB8-124D29CB710B}"/>
               </a:ext>
             </a:extLst>
           </p:cNvPr>
@@ -15034,8 +15047,8 @@
         </p:blipFill>
         <p:spPr>
           <a:xfrm>
-            <a:off x="8841226" y="1499081"/>
-            <a:ext cx="2379827" cy="2094248"/>
+            <a:off x="8785054" y="1401282"/>
+            <a:ext cx="2900159" cy="2330227"/>
           </a:xfrm>
           <a:prstGeom prst="rect">
             <a:avLst/>
@@ -15051,166 +15064,6 @@
   </p:cSld>
   <p:clrMapOvr>
     <a:overrideClrMapping bg1="dk1" tx1="lt1" bg2="dk2" tx2="lt2" accent1="accent1" accent2="accent2" accent3="accent3" accent4="accent4" accent5="accent5" accent6="accent6" hlink="hlink" folHlink="folHlink"/>
-  </p:clrMapOvr>
-</p:sld>
-</file>
-
-<file path=ppt/slides/slide6.xml><?xml version="1.0" encoding="utf-8"?>
-<p:sld xmlns:a="http://schemas.openxmlformats.org/drawingml/2006/main" xmlns:r="http://schemas.openxmlformats.org/officeDocument/2006/relationships" xmlns:p="http://schemas.openxmlformats.org/presentationml/2006/main">
-  <p:cSld>
-    <p:spTree>
-      <p:nvGrpSpPr>
-        <p:cNvPr id="1" name=""/>
-        <p:cNvGrpSpPr/>
-        <p:nvPr/>
-      </p:nvGrpSpPr>
-      <p:grpSpPr>
-        <a:xfrm>
-          <a:off x="0" y="0"/>
-          <a:ext cx="0" cy="0"/>
-          <a:chOff x="0" y="0"/>
-          <a:chExt cx="0" cy="0"/>
-        </a:xfrm>
-      </p:grpSpPr>
-      <p:sp>
-        <p:nvSpPr>
-          <p:cNvPr id="2" name="Title 1">
-            <a:extLst>
-              <a:ext uri="{FF2B5EF4-FFF2-40B4-BE49-F238E27FC236}">
-                <a16:creationId xmlns:a16="http://schemas.microsoft.com/office/drawing/2014/main" id="{AB33B860-54CD-7159-F9FD-EDBD14348800}"/>
-              </a:ext>
-            </a:extLst>
-          </p:cNvPr>
-          <p:cNvSpPr>
-            <a:spLocks noGrp="1"/>
-          </p:cNvSpPr>
-          <p:nvPr>
-            <p:ph type="title"/>
-          </p:nvPr>
-        </p:nvSpPr>
-        <p:spPr/>
-        <p:txBody>
-          <a:bodyPr/>
-          <a:lstStyle/>
-          <a:p>
-            <a:endParaRPr lang="en-IE"/>
-          </a:p>
-        </p:txBody>
-      </p:sp>
-      <p:sp>
-        <p:nvSpPr>
-          <p:cNvPr id="3" name="Content Placeholder 2">
-            <a:extLst>
-              <a:ext uri="{FF2B5EF4-FFF2-40B4-BE49-F238E27FC236}">
-                <a16:creationId xmlns:a16="http://schemas.microsoft.com/office/drawing/2014/main" id="{4F2648ED-AEEB-4856-0232-1086B8080104}"/>
-              </a:ext>
-            </a:extLst>
-          </p:cNvPr>
-          <p:cNvSpPr>
-            <a:spLocks noGrp="1"/>
-          </p:cNvSpPr>
-          <p:nvPr>
-            <p:ph idx="1"/>
-          </p:nvPr>
-        </p:nvSpPr>
-        <p:spPr/>
-        <p:txBody>
-          <a:bodyPr/>
-          <a:lstStyle/>
-          <a:p>
-            <a:endParaRPr lang="en-IE"/>
-          </a:p>
-        </p:txBody>
-      </p:sp>
-    </p:spTree>
-    <p:extLst>
-      <p:ext uri="{BB962C8B-B14F-4D97-AF65-F5344CB8AC3E}">
-        <p14:creationId xmlns:p14="http://schemas.microsoft.com/office/powerpoint/2010/main" val="1098089808"/>
-      </p:ext>
-    </p:extLst>
-  </p:cSld>
-  <p:clrMapOvr>
-    <a:masterClrMapping/>
-  </p:clrMapOvr>
-</p:sld>
-</file>
-
-<file path=ppt/slides/slide7.xml><?xml version="1.0" encoding="utf-8"?>
-<p:sld xmlns:a="http://schemas.openxmlformats.org/drawingml/2006/main" xmlns:r="http://schemas.openxmlformats.org/officeDocument/2006/relationships" xmlns:p="http://schemas.openxmlformats.org/presentationml/2006/main">
-  <p:cSld>
-    <p:spTree>
-      <p:nvGrpSpPr>
-        <p:cNvPr id="1" name=""/>
-        <p:cNvGrpSpPr/>
-        <p:nvPr/>
-      </p:nvGrpSpPr>
-      <p:grpSpPr>
-        <a:xfrm>
-          <a:off x="0" y="0"/>
-          <a:ext cx="0" cy="0"/>
-          <a:chOff x="0" y="0"/>
-          <a:chExt cx="0" cy="0"/>
-        </a:xfrm>
-      </p:grpSpPr>
-      <p:sp>
-        <p:nvSpPr>
-          <p:cNvPr id="2" name="Title 1">
-            <a:extLst>
-              <a:ext uri="{FF2B5EF4-FFF2-40B4-BE49-F238E27FC236}">
-                <a16:creationId xmlns:a16="http://schemas.microsoft.com/office/drawing/2014/main" id="{8FF0293E-3403-289B-3ED9-011C09ED98B6}"/>
-              </a:ext>
-            </a:extLst>
-          </p:cNvPr>
-          <p:cNvSpPr>
-            <a:spLocks noGrp="1"/>
-          </p:cNvSpPr>
-          <p:nvPr>
-            <p:ph type="title"/>
-          </p:nvPr>
-        </p:nvSpPr>
-        <p:spPr/>
-        <p:txBody>
-          <a:bodyPr/>
-          <a:lstStyle/>
-          <a:p>
-            <a:endParaRPr lang="en-IE"/>
-          </a:p>
-        </p:txBody>
-      </p:sp>
-      <p:sp>
-        <p:nvSpPr>
-          <p:cNvPr id="3" name="Content Placeholder 2">
-            <a:extLst>
-              <a:ext uri="{FF2B5EF4-FFF2-40B4-BE49-F238E27FC236}">
-                <a16:creationId xmlns:a16="http://schemas.microsoft.com/office/drawing/2014/main" id="{D6B510C4-A411-1AFD-CD21-A7DBFF70F3E4}"/>
-              </a:ext>
-            </a:extLst>
-          </p:cNvPr>
-          <p:cNvSpPr>
-            <a:spLocks noGrp="1"/>
-          </p:cNvSpPr>
-          <p:nvPr>
-            <p:ph idx="1"/>
-          </p:nvPr>
-        </p:nvSpPr>
-        <p:spPr/>
-        <p:txBody>
-          <a:bodyPr/>
-          <a:lstStyle/>
-          <a:p>
-            <a:endParaRPr lang="en-IE"/>
-          </a:p>
-        </p:txBody>
-      </p:sp>
-    </p:spTree>
-    <p:extLst>
-      <p:ext uri="{BB962C8B-B14F-4D97-AF65-F5344CB8AC3E}">
-        <p14:creationId xmlns:p14="http://schemas.microsoft.com/office/powerpoint/2010/main" val="4173159937"/>
-      </p:ext>
-    </p:extLst>
-  </p:cSld>
-  <p:clrMapOvr>
-    <a:masterClrMapping/>
   </p:clrMapOvr>
 </p:sld>
 </file>

</xml_diff>

<commit_message>
Finished the presentation page in the powerpoint
</commit_message>
<xml_diff>
--- a/Spotify_Playlist_Enhancer_2.pptx
+++ b/Spotify_Playlist_Enhancer_2.pptx
@@ -13316,7 +13316,7 @@
         </p:nvSpPr>
         <p:spPr>
           <a:xfrm>
-            <a:off x="1877331" y="1325879"/>
+            <a:off x="1936885" y="883919"/>
             <a:ext cx="8318229" cy="946045"/>
           </a:xfrm>
         </p:spPr>
@@ -13324,6 +13324,7 @@
           <a:bodyPr/>
           <a:lstStyle/>
           <a:p>
+            <a:pPr algn="ctr"/>
             <a:r>
               <a:rPr lang="en-IE" dirty="0"/>
               <a:t>Spotify Playlist Enhancer</a:t>
@@ -13343,57 +13344,166 @@
         </p:nvSpPr>
         <p:spPr>
           <a:xfrm>
-            <a:off x="4145043" y="2674260"/>
-            <a:ext cx="3618213" cy="861420"/>
+            <a:off x="2986801" y="2339560"/>
+            <a:ext cx="6020037" cy="1417100"/>
           </a:xfrm>
         </p:spPr>
         <p:txBody>
           <a:bodyPr>
-            <a:normAutofit lnSpcReduction="10000"/>
+            <a:noAutofit/>
           </a:bodyPr>
           <a:lstStyle/>
           <a:p>
+            <a:pPr algn="ctr"/>
             <a:r>
-              <a:rPr lang="en-IE" dirty="0" err="1"/>
+              <a:rPr lang="en-IE" sz="2800" dirty="0" err="1"/>
               <a:t>Jevegnij</a:t>
             </a:r>
             <a:r>
-              <a:rPr lang="en-IE" dirty="0"/>
+              <a:rPr lang="en-IE" sz="2800" dirty="0"/>
               <a:t> Ivanov 20748055</a:t>
             </a:r>
             <a:br>
-              <a:rPr lang="en-IE" dirty="0"/>
+              <a:rPr lang="en-IE" sz="2800" dirty="0"/>
             </a:br>
             <a:r>
-              <a:rPr lang="en-IE" dirty="0" err="1"/>
+              <a:rPr lang="en-IE" sz="2800" dirty="0" err="1"/>
               <a:t>Fiachra</a:t>
             </a:r>
             <a:r>
-              <a:rPr lang="en-IE" dirty="0"/>
+              <a:rPr lang="en-IE" sz="2800" dirty="0"/>
               <a:t> </a:t>
             </a:r>
             <a:r>
-              <a:rPr lang="en-IE" dirty="0" err="1"/>
+              <a:rPr lang="en-IE" sz="2800" dirty="0" err="1"/>
               <a:t>Monnelly</a:t>
             </a:r>
             <a:r>
-              <a:rPr lang="en-IE" dirty="0"/>
+              <a:rPr lang="en-IE" sz="2800" dirty="0"/>
               <a:t> 20397701</a:t>
             </a:r>
             <a:br>
-              <a:rPr lang="en-IE" dirty="0"/>
+              <a:rPr lang="en-IE" sz="2800" dirty="0"/>
             </a:br>
             <a:r>
-              <a:rPr lang="en-IE" dirty="0"/>
+              <a:rPr lang="en-IE" sz="2800" dirty="0"/>
               <a:t>Fabian </a:t>
             </a:r>
             <a:r>
-              <a:rPr lang="en-IE" dirty="0" err="1"/>
+              <a:rPr lang="en-IE" sz="2800" dirty="0" err="1"/>
               <a:t>jaskiewicz</a:t>
             </a:r>
             <a:r>
+              <a:rPr lang="en-IE" sz="2800" dirty="0"/>
+              <a:t> 20443346</a:t>
+            </a:r>
+          </a:p>
+        </p:txBody>
+      </p:sp>
+      <p:sp>
+        <p:nvSpPr>
+          <p:cNvPr id="6" name="Title 1">
+            <a:extLst>
+              <a:ext uri="{FF2B5EF4-FFF2-40B4-BE49-F238E27FC236}">
+                <a16:creationId xmlns:a16="http://schemas.microsoft.com/office/drawing/2014/main" id="{C0FCC69F-AB2E-CFE7-17F2-0B23A4CEF29A}"/>
+              </a:ext>
+            </a:extLst>
+          </p:cNvPr>
+          <p:cNvSpPr txBox="1">
+            <a:spLocks/>
+          </p:cNvSpPr>
+          <p:nvPr/>
+        </p:nvSpPr>
+        <p:spPr bwMode="gray">
+          <a:xfrm>
+            <a:off x="862813" y="4770248"/>
+            <a:ext cx="10268015" cy="946045"/>
+          </a:xfrm>
+          <a:prstGeom prst="rect">
+            <a:avLst/>
+          </a:prstGeom>
+        </p:spPr>
+        <p:txBody>
+          <a:bodyPr vert="horz" lIns="91440" tIns="45720" rIns="91440" bIns="45720" rtlCol="0" anchor="b">
+            <a:noAutofit/>
+          </a:bodyPr>
+          <a:lstStyle>
+            <a:lvl1pPr algn="l" defTabSz="457200" rtl="0" eaLnBrk="1" latinLnBrk="0" hangingPunct="1">
+              <a:spcBef>
+                <a:spcPct val="0"/>
+              </a:spcBef>
+              <a:buNone/>
+              <a:defRPr sz="5400" b="0" i="0" kern="1200">
+                <a:solidFill>
+                  <a:schemeClr val="bg2"/>
+                </a:solidFill>
+                <a:latin typeface="+mj-lt"/>
+                <a:ea typeface="+mj-ea"/>
+                <a:cs typeface="+mj-cs"/>
+              </a:defRPr>
+            </a:lvl1pPr>
+            <a:lvl2pPr eaLnBrk="1" hangingPunct="1">
+              <a:defRPr>
+                <a:solidFill>
+                  <a:schemeClr val="tx2"/>
+                </a:solidFill>
+              </a:defRPr>
+            </a:lvl2pPr>
+            <a:lvl3pPr eaLnBrk="1" hangingPunct="1">
+              <a:defRPr>
+                <a:solidFill>
+                  <a:schemeClr val="tx2"/>
+                </a:solidFill>
+              </a:defRPr>
+            </a:lvl3pPr>
+            <a:lvl4pPr eaLnBrk="1" hangingPunct="1">
+              <a:defRPr>
+                <a:solidFill>
+                  <a:schemeClr val="tx2"/>
+                </a:solidFill>
+              </a:defRPr>
+            </a:lvl4pPr>
+            <a:lvl5pPr eaLnBrk="1" hangingPunct="1">
+              <a:defRPr>
+                <a:solidFill>
+                  <a:schemeClr val="tx2"/>
+                </a:solidFill>
+              </a:defRPr>
+            </a:lvl5pPr>
+            <a:lvl6pPr eaLnBrk="1" hangingPunct="1">
+              <a:defRPr>
+                <a:solidFill>
+                  <a:schemeClr val="tx2"/>
+                </a:solidFill>
+              </a:defRPr>
+            </a:lvl6pPr>
+            <a:lvl7pPr eaLnBrk="1" hangingPunct="1">
+              <a:defRPr>
+                <a:solidFill>
+                  <a:schemeClr val="tx2"/>
+                </a:solidFill>
+              </a:defRPr>
+            </a:lvl7pPr>
+            <a:lvl8pPr eaLnBrk="1" hangingPunct="1">
+              <a:defRPr>
+                <a:solidFill>
+                  <a:schemeClr val="tx2"/>
+                </a:solidFill>
+              </a:defRPr>
+            </a:lvl8pPr>
+            <a:lvl9pPr eaLnBrk="1" hangingPunct="1">
+              <a:defRPr>
+                <a:solidFill>
+                  <a:schemeClr val="tx2"/>
+                </a:solidFill>
+              </a:defRPr>
+            </a:lvl9pPr>
+          </a:lstStyle>
+          <a:p>
+            <a:pPr algn="ctr"/>
+            <a:r>
               <a:rPr lang="en-IE" dirty="0"/>
-              <a:t> 20443346</a:t>
+              <a:t>Development progress presentation</a:t>
             </a:r>
           </a:p>
         </p:txBody>
@@ -14401,7 +14511,7 @@
         </p:nvSpPr>
         <p:spPr>
           <a:xfrm>
-            <a:off x="476353" y="384431"/>
+            <a:off x="443003" y="183348"/>
             <a:ext cx="3989747" cy="1020232"/>
           </a:xfrm>
         </p:spPr>
@@ -14669,13 +14779,13 @@
         </p:nvSpPr>
         <p:spPr>
           <a:xfrm>
-            <a:off x="528636" y="1295400"/>
+            <a:off x="500560" y="862754"/>
             <a:ext cx="3853879" cy="3898900"/>
           </a:xfrm>
         </p:spPr>
         <p:txBody>
           <a:bodyPr>
-            <a:normAutofit/>
+            <a:normAutofit fontScale="92500"/>
           </a:bodyPr>
           <a:lstStyle/>
           <a:p>
@@ -14735,7 +14845,7 @@
                   <a:srgbClr val="FFFFFF"/>
                 </a:solidFill>
               </a:rPr>
-              <a:t>The first button opens a new tab in your Chrome browser. For now it’s a placeholder for our Playlist Web API.</a:t>
+              <a:t>The first button opens a new tab in your Chrome browser. For now it’s a Login and Registration page.</a:t>
             </a:r>
           </a:p>
           <a:p>
@@ -14750,23 +14860,67 @@
                   <a:srgbClr val="FFFFFF"/>
                 </a:solidFill>
               </a:rPr>
-              <a:t>-</a:t>
+              <a:t>Created a Login/Registration page</a:t>
             </a:r>
           </a:p>
           <a:p>
-            <a:pPr>
+            <a:pPr lvl="1">
               <a:lnSpc>
                 <a:spcPct val="90000"/>
               </a:lnSpc>
             </a:pPr>
             <a:r>
-              <a:rPr lang="en-IE" sz="1500" dirty="0">
+              <a:rPr lang="en-IE" sz="1300" dirty="0">
                 <a:solidFill>
                   <a:srgbClr val="FFFFFF"/>
                 </a:solidFill>
               </a:rPr>
-              <a:t>-</a:t>
+              <a:t>The chrome extension button now redirects the user to the Login/Registration page.</a:t>
             </a:r>
+          </a:p>
+          <a:p>
+            <a:pPr lvl="1">
+              <a:lnSpc>
+                <a:spcPct val="90000"/>
+              </a:lnSpc>
+            </a:pPr>
+            <a:r>
+              <a:rPr lang="en-IE" sz="1300" dirty="0">
+                <a:solidFill>
+                  <a:srgbClr val="FFFFFF"/>
+                </a:solidFill>
+              </a:rPr>
+              <a:t>The Login/Registration page has Spotify themed style applied through a .</a:t>
+            </a:r>
+            <a:r>
+              <a:rPr lang="en-IE" sz="1300" dirty="0" err="1">
+                <a:solidFill>
+                  <a:srgbClr val="FFFFFF"/>
+                </a:solidFill>
+              </a:rPr>
+              <a:t>css</a:t>
+            </a:r>
+            <a:r>
+              <a:rPr lang="en-IE" sz="1300" dirty="0">
+                <a:solidFill>
+                  <a:srgbClr val="FFFFFF"/>
+                </a:solidFill>
+              </a:rPr>
+              <a:t> script for buttons and text.</a:t>
+            </a:r>
+          </a:p>
+          <a:p>
+            <a:pPr marL="0" indent="0">
+              <a:lnSpc>
+                <a:spcPct val="90000"/>
+              </a:lnSpc>
+              <a:buNone/>
+            </a:pPr>
+            <a:endParaRPr lang="en-IE" sz="1500" dirty="0">
+              <a:solidFill>
+                <a:srgbClr val="FFFFFF"/>
+              </a:solidFill>
+            </a:endParaRPr>
           </a:p>
           <a:p>
             <a:pPr>
@@ -14987,7 +15141,7 @@
         </p:blipFill>
         <p:spPr>
           <a:xfrm>
-            <a:off x="4232357" y="159410"/>
+            <a:off x="4411996" y="577850"/>
             <a:ext cx="4419639" cy="2883044"/>
           </a:xfrm>
           <a:prstGeom prst="rect">
@@ -15017,7 +15171,7 @@
         </p:blipFill>
         <p:spPr>
           <a:xfrm>
-            <a:off x="8760822" y="137061"/>
+            <a:off x="8574192" y="4483395"/>
             <a:ext cx="2438473" cy="1197846"/>
           </a:xfrm>
           <a:prstGeom prst="rect">
@@ -15047,7 +15201,7 @@
         </p:blipFill>
         <p:spPr>
           <a:xfrm>
-            <a:off x="8785054" y="1401282"/>
+            <a:off x="5171735" y="3737549"/>
             <a:ext cx="2900159" cy="2330227"/>
           </a:xfrm>
           <a:prstGeom prst="rect">
@@ -15055,6 +15209,507 @@
           </a:prstGeom>
         </p:spPr>
       </p:pic>
+      <p:pic>
+        <p:nvPicPr>
+          <p:cNvPr id="9" name="Picture 8">
+            <a:extLst>
+              <a:ext uri="{FF2B5EF4-FFF2-40B4-BE49-F238E27FC236}">
+                <a16:creationId xmlns:a16="http://schemas.microsoft.com/office/drawing/2014/main" id="{6C5E6493-B272-1AEF-75F1-50E157CAB497}"/>
+              </a:ext>
+            </a:extLst>
+          </p:cNvPr>
+          <p:cNvPicPr>
+            <a:picLocks noChangeAspect="1"/>
+          </p:cNvPicPr>
+          <p:nvPr/>
+        </p:nvPicPr>
+        <p:blipFill>
+          <a:blip r:embed="rId5"/>
+          <a:stretch>
+            <a:fillRect/>
+          </a:stretch>
+        </p:blipFill>
+        <p:spPr>
+          <a:xfrm>
+            <a:off x="9194217" y="577850"/>
+            <a:ext cx="2733434" cy="3504968"/>
+          </a:xfrm>
+          <a:prstGeom prst="rect">
+            <a:avLst/>
+          </a:prstGeom>
+        </p:spPr>
+      </p:pic>
+      <p:sp>
+        <p:nvSpPr>
+          <p:cNvPr id="11" name="Title 1">
+            <a:extLst>
+              <a:ext uri="{FF2B5EF4-FFF2-40B4-BE49-F238E27FC236}">
+                <a16:creationId xmlns:a16="http://schemas.microsoft.com/office/drawing/2014/main" id="{A8E38634-3D92-E8A6-98CB-C3E1289A9D8F}"/>
+              </a:ext>
+            </a:extLst>
+          </p:cNvPr>
+          <p:cNvSpPr txBox="1">
+            <a:spLocks/>
+          </p:cNvSpPr>
+          <p:nvPr/>
+        </p:nvSpPr>
+        <p:spPr bwMode="gray">
+          <a:xfrm>
+            <a:off x="443003" y="4440487"/>
+            <a:ext cx="3126560" cy="462175"/>
+          </a:xfrm>
+          <a:prstGeom prst="rect">
+            <a:avLst/>
+          </a:prstGeom>
+        </p:spPr>
+        <p:txBody>
+          <a:bodyPr vert="horz" lIns="91440" tIns="45720" rIns="91440" bIns="45720" rtlCol="0" anchor="ctr">
+            <a:normAutofit/>
+          </a:bodyPr>
+          <a:lstStyle>
+            <a:lvl1pPr algn="l" defTabSz="457200" rtl="0" eaLnBrk="1" latinLnBrk="0" hangingPunct="1">
+              <a:spcBef>
+                <a:spcPct val="0"/>
+              </a:spcBef>
+              <a:buNone/>
+              <a:defRPr sz="3600" b="0" i="0" kern="1200">
+                <a:solidFill>
+                  <a:schemeClr val="bg2"/>
+                </a:solidFill>
+                <a:latin typeface="+mj-lt"/>
+                <a:ea typeface="+mj-ea"/>
+                <a:cs typeface="+mj-cs"/>
+              </a:defRPr>
+            </a:lvl1pPr>
+            <a:lvl2pPr eaLnBrk="1" hangingPunct="1">
+              <a:defRPr>
+                <a:solidFill>
+                  <a:schemeClr val="tx2"/>
+                </a:solidFill>
+              </a:defRPr>
+            </a:lvl2pPr>
+            <a:lvl3pPr eaLnBrk="1" hangingPunct="1">
+              <a:defRPr>
+                <a:solidFill>
+                  <a:schemeClr val="tx2"/>
+                </a:solidFill>
+              </a:defRPr>
+            </a:lvl3pPr>
+            <a:lvl4pPr eaLnBrk="1" hangingPunct="1">
+              <a:defRPr>
+                <a:solidFill>
+                  <a:schemeClr val="tx2"/>
+                </a:solidFill>
+              </a:defRPr>
+            </a:lvl4pPr>
+            <a:lvl5pPr eaLnBrk="1" hangingPunct="1">
+              <a:defRPr>
+                <a:solidFill>
+                  <a:schemeClr val="tx2"/>
+                </a:solidFill>
+              </a:defRPr>
+            </a:lvl5pPr>
+            <a:lvl6pPr eaLnBrk="1" hangingPunct="1">
+              <a:defRPr>
+                <a:solidFill>
+                  <a:schemeClr val="tx2"/>
+                </a:solidFill>
+              </a:defRPr>
+            </a:lvl6pPr>
+            <a:lvl7pPr eaLnBrk="1" hangingPunct="1">
+              <a:defRPr>
+                <a:solidFill>
+                  <a:schemeClr val="tx2"/>
+                </a:solidFill>
+              </a:defRPr>
+            </a:lvl7pPr>
+            <a:lvl8pPr eaLnBrk="1" hangingPunct="1">
+              <a:defRPr>
+                <a:solidFill>
+                  <a:schemeClr val="tx2"/>
+                </a:solidFill>
+              </a:defRPr>
+            </a:lvl8pPr>
+            <a:lvl9pPr eaLnBrk="1" hangingPunct="1">
+              <a:defRPr>
+                <a:solidFill>
+                  <a:schemeClr val="tx2"/>
+                </a:solidFill>
+              </a:defRPr>
+            </a:lvl9pPr>
+          </a:lstStyle>
+          <a:p>
+            <a:pPr>
+              <a:lnSpc>
+                <a:spcPct val="90000"/>
+              </a:lnSpc>
+            </a:pPr>
+            <a:r>
+              <a:rPr lang="en-IE" sz="2000" dirty="0">
+                <a:solidFill>
+                  <a:srgbClr val="EBEBEB"/>
+                </a:solidFill>
+              </a:rPr>
+              <a:t>Next objectives/goals</a:t>
+            </a:r>
+          </a:p>
+        </p:txBody>
+      </p:sp>
+      <p:sp>
+        <p:nvSpPr>
+          <p:cNvPr id="15" name="Content Placeholder 2">
+            <a:extLst>
+              <a:ext uri="{FF2B5EF4-FFF2-40B4-BE49-F238E27FC236}">
+                <a16:creationId xmlns:a16="http://schemas.microsoft.com/office/drawing/2014/main" id="{894D2F3B-511F-28E4-53F4-550A1B265752}"/>
+              </a:ext>
+            </a:extLst>
+          </p:cNvPr>
+          <p:cNvSpPr txBox="1">
+            <a:spLocks/>
+          </p:cNvSpPr>
+          <p:nvPr/>
+        </p:nvSpPr>
+        <p:spPr>
+          <a:xfrm>
+            <a:off x="467764" y="4884705"/>
+            <a:ext cx="4161169" cy="1746816"/>
+          </a:xfrm>
+          <a:prstGeom prst="rect">
+            <a:avLst/>
+          </a:prstGeom>
+        </p:spPr>
+        <p:txBody>
+          <a:bodyPr vert="horz" lIns="91440" tIns="45720" rIns="91440" bIns="45720" rtlCol="0">
+            <a:normAutofit fontScale="70000" lnSpcReduction="20000"/>
+          </a:bodyPr>
+          <a:lstStyle>
+            <a:lvl1pPr marL="342900" indent="-342900" algn="l" defTabSz="457200" rtl="0" eaLnBrk="1" latinLnBrk="0" hangingPunct="1">
+              <a:spcBef>
+                <a:spcPts val="1000"/>
+              </a:spcBef>
+              <a:spcAft>
+                <a:spcPts val="0"/>
+              </a:spcAft>
+              <a:buClr>
+                <a:schemeClr val="accent1"/>
+              </a:buClr>
+              <a:buSzPct val="80000"/>
+              <a:buFont typeface="Wingdings 3" charset="2"/>
+              <a:buChar char=""/>
+              <a:defRPr sz="1800" b="0" i="0" kern="1200">
+                <a:solidFill>
+                  <a:schemeClr val="tx1">
+                    <a:lumMod val="75000"/>
+                    <a:lumOff val="25000"/>
+                  </a:schemeClr>
+                </a:solidFill>
+                <a:latin typeface="+mn-lt"/>
+                <a:ea typeface="+mn-ea"/>
+                <a:cs typeface="+mn-cs"/>
+              </a:defRPr>
+            </a:lvl1pPr>
+            <a:lvl2pPr marL="742950" indent="-285750" algn="l" defTabSz="457200" rtl="0" eaLnBrk="1" latinLnBrk="0" hangingPunct="1">
+              <a:spcBef>
+                <a:spcPts val="1000"/>
+              </a:spcBef>
+              <a:spcAft>
+                <a:spcPts val="0"/>
+              </a:spcAft>
+              <a:buClr>
+                <a:schemeClr val="accent1"/>
+              </a:buClr>
+              <a:buSzPct val="80000"/>
+              <a:buFont typeface="Wingdings 3" charset="2"/>
+              <a:buChar char=""/>
+              <a:defRPr sz="1600" b="0" i="0" kern="1200">
+                <a:solidFill>
+                  <a:schemeClr val="tx1">
+                    <a:lumMod val="75000"/>
+                    <a:lumOff val="25000"/>
+                  </a:schemeClr>
+                </a:solidFill>
+                <a:latin typeface="+mn-lt"/>
+                <a:ea typeface="+mn-ea"/>
+                <a:cs typeface="+mn-cs"/>
+              </a:defRPr>
+            </a:lvl2pPr>
+            <a:lvl3pPr marL="1143000" indent="-228600" algn="l" defTabSz="457200" rtl="0" eaLnBrk="1" latinLnBrk="0" hangingPunct="1">
+              <a:spcBef>
+                <a:spcPts val="1000"/>
+              </a:spcBef>
+              <a:spcAft>
+                <a:spcPts val="0"/>
+              </a:spcAft>
+              <a:buClr>
+                <a:schemeClr val="accent1"/>
+              </a:buClr>
+              <a:buSzPct val="80000"/>
+              <a:buFont typeface="Wingdings 3" charset="2"/>
+              <a:buChar char=""/>
+              <a:defRPr sz="1400" b="0" i="0" kern="1200">
+                <a:solidFill>
+                  <a:schemeClr val="tx1">
+                    <a:lumMod val="75000"/>
+                    <a:lumOff val="25000"/>
+                  </a:schemeClr>
+                </a:solidFill>
+                <a:latin typeface="+mn-lt"/>
+                <a:ea typeface="+mn-ea"/>
+                <a:cs typeface="+mn-cs"/>
+              </a:defRPr>
+            </a:lvl3pPr>
+            <a:lvl4pPr marL="1600200" indent="-228600" algn="l" defTabSz="457200" rtl="0" eaLnBrk="1" latinLnBrk="0" hangingPunct="1">
+              <a:spcBef>
+                <a:spcPts val="1000"/>
+              </a:spcBef>
+              <a:spcAft>
+                <a:spcPts val="0"/>
+              </a:spcAft>
+              <a:buClr>
+                <a:schemeClr val="accent1"/>
+              </a:buClr>
+              <a:buSzPct val="80000"/>
+              <a:buFont typeface="Wingdings 3" charset="2"/>
+              <a:buChar char=""/>
+              <a:defRPr sz="1200" b="0" i="0" kern="1200">
+                <a:solidFill>
+                  <a:schemeClr val="tx1">
+                    <a:lumMod val="75000"/>
+                    <a:lumOff val="25000"/>
+                  </a:schemeClr>
+                </a:solidFill>
+                <a:latin typeface="+mn-lt"/>
+                <a:ea typeface="+mn-ea"/>
+                <a:cs typeface="+mn-cs"/>
+              </a:defRPr>
+            </a:lvl4pPr>
+            <a:lvl5pPr marL="2057400" indent="-228600" algn="l" defTabSz="457200" rtl="0" eaLnBrk="1" latinLnBrk="0" hangingPunct="1">
+              <a:spcBef>
+                <a:spcPts val="1000"/>
+              </a:spcBef>
+              <a:spcAft>
+                <a:spcPts val="0"/>
+              </a:spcAft>
+              <a:buClr>
+                <a:schemeClr val="accent1"/>
+              </a:buClr>
+              <a:buSzPct val="80000"/>
+              <a:buFont typeface="Wingdings 3" charset="2"/>
+              <a:buChar char=""/>
+              <a:defRPr sz="1200" b="0" i="0" kern="1200">
+                <a:solidFill>
+                  <a:schemeClr val="tx1">
+                    <a:lumMod val="75000"/>
+                    <a:lumOff val="25000"/>
+                  </a:schemeClr>
+                </a:solidFill>
+                <a:latin typeface="+mn-lt"/>
+                <a:ea typeface="+mn-ea"/>
+                <a:cs typeface="+mn-cs"/>
+              </a:defRPr>
+            </a:lvl5pPr>
+            <a:lvl6pPr marL="2514600" indent="-228600" algn="l" defTabSz="457200" rtl="0" eaLnBrk="1" latinLnBrk="0" hangingPunct="1">
+              <a:spcBef>
+                <a:spcPts val="1000"/>
+              </a:spcBef>
+              <a:spcAft>
+                <a:spcPts val="0"/>
+              </a:spcAft>
+              <a:buClr>
+                <a:schemeClr val="accent1"/>
+              </a:buClr>
+              <a:buSzPct val="80000"/>
+              <a:buFont typeface="Wingdings 3" charset="2"/>
+              <a:buChar char=""/>
+              <a:defRPr sz="1200" b="0" i="0" kern="1200">
+                <a:solidFill>
+                  <a:schemeClr val="tx1">
+                    <a:lumMod val="75000"/>
+                    <a:lumOff val="25000"/>
+                  </a:schemeClr>
+                </a:solidFill>
+                <a:latin typeface="+mn-lt"/>
+                <a:ea typeface="+mn-ea"/>
+                <a:cs typeface="+mn-cs"/>
+              </a:defRPr>
+            </a:lvl6pPr>
+            <a:lvl7pPr marL="2971800" indent="-228600" algn="l" defTabSz="457200" rtl="0" eaLnBrk="1" latinLnBrk="0" hangingPunct="1">
+              <a:spcBef>
+                <a:spcPts val="1000"/>
+              </a:spcBef>
+              <a:spcAft>
+                <a:spcPts val="0"/>
+              </a:spcAft>
+              <a:buClr>
+                <a:schemeClr val="accent1"/>
+              </a:buClr>
+              <a:buSzPct val="80000"/>
+              <a:buFont typeface="Wingdings 3" charset="2"/>
+              <a:buChar char=""/>
+              <a:defRPr sz="1200" b="0" i="0" kern="1200">
+                <a:solidFill>
+                  <a:schemeClr val="tx1">
+                    <a:lumMod val="75000"/>
+                    <a:lumOff val="25000"/>
+                  </a:schemeClr>
+                </a:solidFill>
+                <a:latin typeface="+mn-lt"/>
+                <a:ea typeface="+mn-ea"/>
+                <a:cs typeface="+mn-cs"/>
+              </a:defRPr>
+            </a:lvl7pPr>
+            <a:lvl8pPr marL="3429000" indent="-228600" algn="l" defTabSz="457200" rtl="0" eaLnBrk="1" latinLnBrk="0" hangingPunct="1">
+              <a:spcBef>
+                <a:spcPts val="1000"/>
+              </a:spcBef>
+              <a:spcAft>
+                <a:spcPts val="0"/>
+              </a:spcAft>
+              <a:buClr>
+                <a:schemeClr val="accent1"/>
+              </a:buClr>
+              <a:buSzPct val="80000"/>
+              <a:buFont typeface="Wingdings 3" charset="2"/>
+              <a:buChar char=""/>
+              <a:defRPr sz="1200" b="0" i="0" kern="1200">
+                <a:solidFill>
+                  <a:schemeClr val="tx1">
+                    <a:lumMod val="75000"/>
+                    <a:lumOff val="25000"/>
+                  </a:schemeClr>
+                </a:solidFill>
+                <a:latin typeface="+mn-lt"/>
+                <a:ea typeface="+mn-ea"/>
+                <a:cs typeface="+mn-cs"/>
+              </a:defRPr>
+            </a:lvl8pPr>
+            <a:lvl9pPr marL="3886200" indent="-228600" algn="l" defTabSz="457200" rtl="0" eaLnBrk="1" latinLnBrk="0" hangingPunct="1">
+              <a:spcBef>
+                <a:spcPts val="1000"/>
+              </a:spcBef>
+              <a:spcAft>
+                <a:spcPts val="0"/>
+              </a:spcAft>
+              <a:buClr>
+                <a:schemeClr val="accent1"/>
+              </a:buClr>
+              <a:buSzPct val="80000"/>
+              <a:buFont typeface="Wingdings 3" charset="2"/>
+              <a:buChar char=""/>
+              <a:defRPr sz="1200" b="0" i="0" kern="1200">
+                <a:solidFill>
+                  <a:schemeClr val="tx1">
+                    <a:lumMod val="75000"/>
+                    <a:lumOff val="25000"/>
+                  </a:schemeClr>
+                </a:solidFill>
+                <a:latin typeface="+mn-lt"/>
+                <a:ea typeface="+mn-ea"/>
+                <a:cs typeface="+mn-cs"/>
+              </a:defRPr>
+            </a:lvl9pPr>
+          </a:lstStyle>
+          <a:p>
+            <a:pPr>
+              <a:lnSpc>
+                <a:spcPct val="90000"/>
+              </a:lnSpc>
+            </a:pPr>
+            <a:r>
+              <a:rPr lang="en-IE" dirty="0">
+                <a:solidFill>
+                  <a:srgbClr val="FFFFFF"/>
+                </a:solidFill>
+              </a:rPr>
+              <a:t>Firebase Data Storage</a:t>
+            </a:r>
+          </a:p>
+          <a:p>
+            <a:pPr lvl="1">
+              <a:lnSpc>
+                <a:spcPct val="90000"/>
+              </a:lnSpc>
+            </a:pPr>
+            <a:r>
+              <a:rPr lang="en-IE" dirty="0">
+                <a:solidFill>
+                  <a:srgbClr val="FFFFFF"/>
+                </a:solidFill>
+              </a:rPr>
+              <a:t>Collaborate with Fabian. Connect Firebase to store login/registration and song/playlist data.</a:t>
+            </a:r>
+          </a:p>
+          <a:p>
+            <a:pPr>
+              <a:lnSpc>
+                <a:spcPct val="90000"/>
+              </a:lnSpc>
+            </a:pPr>
+            <a:r>
+              <a:rPr lang="en-IE" sz="1700" dirty="0">
+                <a:solidFill>
+                  <a:srgbClr val="FFFFFF"/>
+                </a:solidFill>
+              </a:rPr>
+              <a:t>Help with React UI design</a:t>
+            </a:r>
+          </a:p>
+          <a:p>
+            <a:pPr lvl="1">
+              <a:lnSpc>
+                <a:spcPct val="90000"/>
+              </a:lnSpc>
+            </a:pPr>
+            <a:r>
+              <a:rPr lang="en-IE" sz="1500" dirty="0">
+                <a:solidFill>
+                  <a:srgbClr val="FFFFFF"/>
+                </a:solidFill>
+              </a:rPr>
+              <a:t>Collaborate with Fiachra to help him make a design for our web API to manage playlists.</a:t>
+            </a:r>
+          </a:p>
+          <a:p>
+            <a:pPr lvl="1">
+              <a:lnSpc>
+                <a:spcPct val="90000"/>
+              </a:lnSpc>
+            </a:pPr>
+            <a:r>
+              <a:rPr lang="en-IE" sz="1500" dirty="0">
+                <a:solidFill>
+                  <a:srgbClr val="FFFFFF"/>
+                </a:solidFill>
+              </a:rPr>
+              <a:t>Add functionality to buttons in Web API</a:t>
+            </a:r>
+          </a:p>
+          <a:p>
+            <a:pPr>
+              <a:lnSpc>
+                <a:spcPct val="90000"/>
+              </a:lnSpc>
+            </a:pPr>
+            <a:endParaRPr lang="en-IE" sz="1500" dirty="0">
+              <a:solidFill>
+                <a:srgbClr val="FFFFFF"/>
+              </a:solidFill>
+            </a:endParaRPr>
+          </a:p>
+          <a:p>
+            <a:pPr>
+              <a:lnSpc>
+                <a:spcPct val="90000"/>
+              </a:lnSpc>
+            </a:pPr>
+            <a:endParaRPr lang="en-IE" sz="1500" dirty="0">
+              <a:solidFill>
+                <a:srgbClr val="FFFFFF"/>
+              </a:solidFill>
+            </a:endParaRPr>
+          </a:p>
+        </p:txBody>
+      </p:sp>
     </p:spTree>
     <p:extLst>
       <p:ext uri="{BB962C8B-B14F-4D97-AF65-F5344CB8AC3E}">

</xml_diff>

<commit_message>
minor adjustments to presentation
</commit_message>
<xml_diff>
--- a/Spotify_Playlist_Enhancer_2.pptx
+++ b/Spotify_Playlist_Enhancer_2.pptx
@@ -15141,7 +15141,7 @@
         </p:blipFill>
         <p:spPr>
           <a:xfrm>
-            <a:off x="4411996" y="577850"/>
+            <a:off x="4545955" y="825605"/>
             <a:ext cx="4419639" cy="2883044"/>
           </a:xfrm>
           <a:prstGeom prst="rect">
@@ -15171,7 +15171,7 @@
         </p:blipFill>
         <p:spPr>
           <a:xfrm>
-            <a:off x="8574192" y="4483395"/>
+            <a:off x="4680313" y="3909732"/>
             <a:ext cx="2438473" cy="1197846"/>
           </a:xfrm>
           <a:prstGeom prst="rect">
@@ -15201,7 +15201,7 @@
         </p:blipFill>
         <p:spPr>
           <a:xfrm>
-            <a:off x="5171735" y="3737549"/>
+            <a:off x="7440518" y="4213451"/>
             <a:ext cx="2900159" cy="2330227"/>
           </a:xfrm>
           <a:prstGeom prst="rect">
@@ -15231,7 +15231,7 @@
         </p:blipFill>
         <p:spPr>
           <a:xfrm>
-            <a:off x="9194217" y="577850"/>
+            <a:off x="9291468" y="587644"/>
             <a:ext cx="2733434" cy="3504968"/>
           </a:xfrm>
           <a:prstGeom prst="rect">

</xml_diff>

<commit_message>
Minor adjustments to the presentation file
</commit_message>
<xml_diff>
--- a/Spotify_Playlist_Enhancer_2.pptx
+++ b/Spotify_Playlist_Enhancer_2.pptx
@@ -15141,7 +15141,7 @@
         </p:blipFill>
         <p:spPr>
           <a:xfrm>
-            <a:off x="4545955" y="825605"/>
+            <a:off x="4419548" y="369276"/>
             <a:ext cx="4419639" cy="2883044"/>
           </a:xfrm>
           <a:prstGeom prst="rect">
@@ -15171,7 +15171,7 @@
         </p:blipFill>
         <p:spPr>
           <a:xfrm>
-            <a:off x="4680313" y="3909732"/>
+            <a:off x="8935146" y="402164"/>
             <a:ext cx="2438473" cy="1197846"/>
           </a:xfrm>
           <a:prstGeom prst="rect">
@@ -15201,7 +15201,7 @@
         </p:blipFill>
         <p:spPr>
           <a:xfrm>
-            <a:off x="7440518" y="4213451"/>
+            <a:off x="9146540" y="1661778"/>
             <a:ext cx="2900159" cy="2330227"/>
           </a:xfrm>
           <a:prstGeom prst="rect">
@@ -15231,8 +15231,8 @@
         </p:blipFill>
         <p:spPr>
           <a:xfrm>
-            <a:off x="9291468" y="587644"/>
-            <a:ext cx="2733434" cy="3504968"/>
+            <a:off x="4503617" y="3298439"/>
+            <a:ext cx="2471014" cy="3168478"/>
           </a:xfrm>
           <a:prstGeom prst="rect">
             <a:avLst/>
@@ -15705,6 +15705,92 @@
             <a:endParaRPr lang="en-IE" sz="1500" dirty="0">
               <a:solidFill>
                 <a:srgbClr val="FFFFFF"/>
+              </a:solidFill>
+            </a:endParaRPr>
+          </a:p>
+        </p:txBody>
+      </p:sp>
+      <p:pic>
+        <p:nvPicPr>
+          <p:cNvPr id="17" name="Picture 16">
+            <a:extLst>
+              <a:ext uri="{FF2B5EF4-FFF2-40B4-BE49-F238E27FC236}">
+                <a16:creationId xmlns:a16="http://schemas.microsoft.com/office/drawing/2014/main" id="{F46A9FC8-865E-C3A2-BE3A-8EBBF8AC3060}"/>
+              </a:ext>
+            </a:extLst>
+          </p:cNvPr>
+          <p:cNvPicPr>
+            <a:picLocks noChangeAspect="1"/>
+          </p:cNvPicPr>
+          <p:nvPr/>
+        </p:nvPicPr>
+        <p:blipFill>
+          <a:blip r:embed="rId6"/>
+          <a:stretch>
+            <a:fillRect/>
+          </a:stretch>
+        </p:blipFill>
+        <p:spPr>
+          <a:xfrm>
+            <a:off x="7057609" y="3292898"/>
+            <a:ext cx="2467716" cy="3168478"/>
+          </a:xfrm>
+          <a:prstGeom prst="rect">
+            <a:avLst/>
+          </a:prstGeom>
+        </p:spPr>
+      </p:pic>
+      <p:sp>
+        <p:nvSpPr>
+          <p:cNvPr id="21" name="Arrow: Circular 20">
+            <a:extLst>
+              <a:ext uri="{FF2B5EF4-FFF2-40B4-BE49-F238E27FC236}">
+                <a16:creationId xmlns:a16="http://schemas.microsoft.com/office/drawing/2014/main" id="{95455BBC-F8AF-15CB-A673-171BE4BE8C27}"/>
+              </a:ext>
+            </a:extLst>
+          </p:cNvPr>
+          <p:cNvSpPr/>
+          <p:nvPr/>
+        </p:nvSpPr>
+        <p:spPr>
+          <a:xfrm rot="5400000">
+            <a:off x="8650661" y="1723198"/>
+            <a:ext cx="2154266" cy="3058245"/>
+          </a:xfrm>
+          <a:prstGeom prst="circularArrow">
+            <a:avLst>
+              <a:gd name="adj1" fmla="val 4400"/>
+              <a:gd name="adj2" fmla="val 2845555"/>
+              <a:gd name="adj3" fmla="val 20605413"/>
+              <a:gd name="adj4" fmla="val 13621479"/>
+              <a:gd name="adj5" fmla="val 6386"/>
+            </a:avLst>
+          </a:prstGeom>
+        </p:spPr>
+        <p:style>
+          <a:lnRef idx="2">
+            <a:schemeClr val="accent1">
+              <a:shade val="15000"/>
+            </a:schemeClr>
+          </a:lnRef>
+          <a:fillRef idx="1">
+            <a:schemeClr val="accent1"/>
+          </a:fillRef>
+          <a:effectRef idx="0">
+            <a:schemeClr val="accent1"/>
+          </a:effectRef>
+          <a:fontRef idx="minor">
+            <a:schemeClr val="lt1"/>
+          </a:fontRef>
+        </p:style>
+        <p:txBody>
+          <a:bodyPr rtlCol="0" anchor="ctr"/>
+          <a:lstStyle/>
+          <a:p>
+            <a:pPr algn="ctr"/>
+            <a:endParaRPr lang="en-IE">
+              <a:solidFill>
+                <a:schemeClr val="tx1"/>
               </a:solidFill>
             </a:endParaRPr>
           </a:p>

</xml_diff>

<commit_message>
The extension now has a nice player and list of songs to select
</commit_message>
<xml_diff>
--- a/Spotify_Playlist_Enhancer_2.pptx
+++ b/Spotify_Playlist_Enhancer_2.pptx
@@ -15796,6 +15796,36 @@
           </a:p>
         </p:txBody>
       </p:sp>
+      <p:pic>
+        <p:nvPicPr>
+          <p:cNvPr id="6" name="Picture 5">
+            <a:extLst>
+              <a:ext uri="{FF2B5EF4-FFF2-40B4-BE49-F238E27FC236}">
+                <a16:creationId xmlns:a16="http://schemas.microsoft.com/office/drawing/2014/main" id="{1236982A-BEC2-4D9A-2BE4-584D9379ECAC}"/>
+              </a:ext>
+            </a:extLst>
+          </p:cNvPr>
+          <p:cNvPicPr>
+            <a:picLocks noChangeAspect="1"/>
+          </p:cNvPicPr>
+          <p:nvPr/>
+        </p:nvPicPr>
+        <p:blipFill>
+          <a:blip r:embed="rId7"/>
+          <a:stretch>
+            <a:fillRect/>
+          </a:stretch>
+        </p:blipFill>
+        <p:spPr>
+          <a:xfrm>
+            <a:off x="9839829" y="4703859"/>
+            <a:ext cx="2041266" cy="1512593"/>
+          </a:xfrm>
+          <a:prstGeom prst="rect">
+            <a:avLst/>
+          </a:prstGeom>
+        </p:spPr>
+      </p:pic>
     </p:spTree>
     <p:extLst>
       <p:ext uri="{BB962C8B-B14F-4D97-AF65-F5344CB8AC3E}">

</xml_diff>

<commit_message>
added another page to presentation file
</commit_message>
<xml_diff>
--- a/Spotify_Playlist_Enhancer_2.pptx
+++ b/Spotify_Playlist_Enhancer_2.pptx
@@ -10,6 +10,7 @@
     <p:sldId id="257" r:id="rId4"/>
     <p:sldId id="259" r:id="rId5"/>
     <p:sldId id="260" r:id="rId6"/>
+    <p:sldId id="261" r:id="rId7"/>
   </p:sldIdLst>
   <p:sldSz cx="12192000" cy="6858000"/>
   <p:notesSz cx="6858000" cy="9144000"/>
@@ -15839,6 +15840,139 @@
 </p:sld>
 </file>
 
+<file path=ppt/slides/slide6.xml><?xml version="1.0" encoding="utf-8"?>
+<p:sld xmlns:a="http://schemas.openxmlformats.org/drawingml/2006/main" xmlns:r="http://schemas.openxmlformats.org/officeDocument/2006/relationships" xmlns:p="http://schemas.openxmlformats.org/presentationml/2006/main">
+  <p:cSld>
+    <p:spTree>
+      <p:nvGrpSpPr>
+        <p:cNvPr id="1" name=""/>
+        <p:cNvGrpSpPr/>
+        <p:nvPr/>
+      </p:nvGrpSpPr>
+      <p:grpSpPr>
+        <a:xfrm>
+          <a:off x="0" y="0"/>
+          <a:ext cx="0" cy="0"/>
+          <a:chOff x="0" y="0"/>
+          <a:chExt cx="0" cy="0"/>
+        </a:xfrm>
+      </p:grpSpPr>
+      <p:sp>
+        <p:nvSpPr>
+          <p:cNvPr id="2" name="Title 1"/>
+          <p:cNvSpPr>
+            <a:spLocks noGrp="1"/>
+          </p:cNvSpPr>
+          <p:nvPr>
+            <p:ph type="title"/>
+          </p:nvPr>
+        </p:nvSpPr>
+        <p:spPr>
+          <a:xfrm>
+            <a:off x="1154954" y="973668"/>
+            <a:ext cx="9520666" cy="706964"/>
+          </a:xfrm>
+        </p:spPr>
+        <p:txBody>
+          <a:bodyPr/>
+          <a:lstStyle/>
+          <a:p>
+            <a:r>
+              <a:rPr lang="en-IE" dirty="0"/>
+              <a:t>Future plans and goals for development</a:t>
+            </a:r>
+          </a:p>
+        </p:txBody>
+      </p:sp>
+      <p:sp>
+        <p:nvSpPr>
+          <p:cNvPr id="3" name="Content Placeholder 2"/>
+          <p:cNvSpPr>
+            <a:spLocks noGrp="1"/>
+          </p:cNvSpPr>
+          <p:nvPr>
+            <p:ph idx="1"/>
+          </p:nvPr>
+        </p:nvSpPr>
+        <p:spPr>
+          <a:xfrm>
+            <a:off x="1154954" y="2603500"/>
+            <a:ext cx="10305526" cy="3561080"/>
+          </a:xfrm>
+        </p:spPr>
+        <p:txBody>
+          <a:bodyPr>
+            <a:normAutofit fontScale="92500" lnSpcReduction="10000"/>
+          </a:bodyPr>
+          <a:lstStyle/>
+          <a:p>
+            <a:r>
+              <a:rPr lang="en-IE" dirty="0"/>
+              <a:t>Spotify API – Establish connection</a:t>
+            </a:r>
+          </a:p>
+          <a:p>
+            <a:pPr lvl="1"/>
+            <a:r>
+              <a:rPr lang="en-IE" dirty="0"/>
+              <a:t>Personal Spotify account authorization, for access to account playlist, songs and more</a:t>
+            </a:r>
+          </a:p>
+          <a:p>
+            <a:pPr lvl="1"/>
+            <a:r>
+              <a:rPr lang="en-IE" dirty="0"/>
+              <a:t>Learn how to use Spotify API to export and manipulate songs and podcasts, and then implement the functionality with our extension</a:t>
+            </a:r>
+          </a:p>
+          <a:p>
+            <a:r>
+              <a:rPr lang="en-IE" dirty="0"/>
+              <a:t>Firebase integration</a:t>
+            </a:r>
+          </a:p>
+          <a:p>
+            <a:pPr lvl="1"/>
+            <a:r>
+              <a:rPr lang="en-IE" dirty="0"/>
+              <a:t>Add Firebase for various use of data features, such as storing account information and music/podcast data</a:t>
+            </a:r>
+          </a:p>
+          <a:p>
+            <a:pPr lvl="1"/>
+            <a:r>
+              <a:rPr lang="en-IE" dirty="0"/>
+              <a:t>Learn how to correctly implement Firebase tools and features for our project, experiment and test available functionality</a:t>
+            </a:r>
+          </a:p>
+          <a:p>
+            <a:r>
+              <a:rPr lang="en-IE" dirty="0"/>
+              <a:t>Continue to work and improve Web API UI</a:t>
+            </a:r>
+          </a:p>
+          <a:p>
+            <a:pPr lvl="1"/>
+            <a:r>
+              <a:rPr lang="en-IE" dirty="0"/>
+              <a:t>Continue to improve the front-end for all our project features, such as Playlist management UI (React API) and the Chrome extension UI.</a:t>
+            </a:r>
+          </a:p>
+        </p:txBody>
+      </p:sp>
+    </p:spTree>
+    <p:extLst>
+      <p:ext uri="{BB962C8B-B14F-4D97-AF65-F5344CB8AC3E}">
+        <p14:creationId xmlns:p14="http://schemas.microsoft.com/office/powerpoint/2010/main" val="2204549344"/>
+      </p:ext>
+    </p:extLst>
+  </p:cSld>
+  <p:clrMapOvr>
+    <a:masterClrMapping/>
+  </p:clrMapOvr>
+</p:sld>
+</file>
+
 <file path=ppt/theme/theme1.xml><?xml version="1.0" encoding="utf-8"?>
 <a:theme xmlns:a="http://schemas.openxmlformats.org/drawingml/2006/main" name="Ion Boardroom">
   <a:themeElements>

</xml_diff>

<commit_message>
some more changes done to the presentation
</commit_message>
<xml_diff>
--- a/Spotify_Playlist_Enhancer_2.pptx
+++ b/Spotify_Playlist_Enhancer_2.pptx
@@ -492,7 +492,7 @@
             <a:fld id="{5923F103-BC34-4FE4-A40E-EDDEECFDA5D0}" type="datetimeFigureOut">
               <a:rPr lang="en-US" dirty="0"/>
               <a:pPr/>
-              <a:t>12/5/2023</a:t>
+              <a:t>12/6/2023</a:t>
             </a:fld>
             <a:endParaRPr lang="en-US" dirty="0"/>
           </a:p>
@@ -1580,7 +1580,7 @@
           <a:p>
             <a:fld id="{923A1CC3-2375-41D4-9E03-427CAF2A4C1A}" type="datetimeFigureOut">
               <a:rPr lang="en-US" dirty="0"/>
-              <a:t>12/5/2023</a:t>
+              <a:t>12/6/2023</a:t>
             </a:fld>
             <a:endParaRPr lang="en-US" dirty="0"/>
           </a:p>
@@ -2560,7 +2560,7 @@
           <a:p>
             <a:fld id="{AFF16868-8199-4C2C-A5B1-63AEE139F88E}" type="datetimeFigureOut">
               <a:rPr lang="en-US" dirty="0"/>
-              <a:t>12/5/2023</a:t>
+              <a:t>12/6/2023</a:t>
             </a:fld>
             <a:endParaRPr lang="en-US" dirty="0"/>
           </a:p>
@@ -3694,7 +3694,7 @@
           <a:p>
             <a:fld id="{AAD9FF7F-6988-44CC-821B-644E70CD2F73}" type="datetimeFigureOut">
               <a:rPr lang="en-US" dirty="0"/>
-              <a:t>12/5/2023</a:t>
+              <a:t>12/6/2023</a:t>
             </a:fld>
             <a:endParaRPr lang="en-US" dirty="0"/>
           </a:p>
@@ -4727,7 +4727,7 @@
           <a:p>
             <a:fld id="{5C12C299-16B2-4475-990D-751901EACC14}" type="datetimeFigureOut">
               <a:rPr lang="en-US" dirty="0"/>
-              <a:t>12/5/2023</a:t>
+              <a:t>12/6/2023</a:t>
             </a:fld>
             <a:endParaRPr lang="en-US" dirty="0"/>
           </a:p>
@@ -5387,7 +5387,7 @@
           <a:p>
             <a:fld id="{9FE86839-B9D8-4651-8783-F325ECE74E65}" type="datetimeFigureOut">
               <a:rPr lang="en-US" dirty="0"/>
-              <a:t>12/5/2023</a:t>
+              <a:t>12/6/2023</a:t>
             </a:fld>
             <a:endParaRPr lang="en-US" dirty="0"/>
           </a:p>
@@ -6248,7 +6248,7 @@
           <a:p>
             <a:fld id="{FD484F64-32F6-45C5-931F-ADC1662401D0}" type="datetimeFigureOut">
               <a:rPr lang="en-US" dirty="0"/>
-              <a:t>12/5/2023</a:t>
+              <a:t>12/6/2023</a:t>
             </a:fld>
             <a:endParaRPr lang="en-US" dirty="0"/>
           </a:p>
@@ -6438,7 +6438,7 @@
           <a:p>
             <a:fld id="{53086D93-FCAC-47E0-A2EE-787E62CA814C}" type="datetimeFigureOut">
               <a:rPr lang="en-US" dirty="0"/>
-              <a:t>12/5/2023</a:t>
+              <a:t>12/6/2023</a:t>
             </a:fld>
             <a:endParaRPr lang="en-US" dirty="0"/>
           </a:p>
@@ -7410,7 +7410,7 @@
           <a:p>
             <a:fld id="{CDA879A6-0FD0-4734-A311-86BFCA472E6E}" type="datetimeFigureOut">
               <a:rPr lang="en-US" dirty="0"/>
-              <a:t>12/5/2023</a:t>
+              <a:t>12/6/2023</a:t>
             </a:fld>
             <a:endParaRPr lang="en-US" dirty="0"/>
           </a:p>
@@ -7621,7 +7621,7 @@
           <a:p>
             <a:fld id="{19C9CA7B-DFD4-44B5-8C60-D14B8CD1FB59}" type="datetimeFigureOut">
               <a:rPr lang="en-US" dirty="0"/>
-              <a:t>12/5/2023</a:t>
+              <a:t>12/6/2023</a:t>
             </a:fld>
             <a:endParaRPr lang="en-US" dirty="0"/>
           </a:p>
@@ -8655,7 +8655,7 @@
           <a:p>
             <a:fld id="{F34E6425-0181-43F2-84FC-787E803FD2F8}" type="datetimeFigureOut">
               <a:rPr lang="en-US" dirty="0"/>
-              <a:t>12/5/2023</a:t>
+              <a:t>12/6/2023</a:t>
             </a:fld>
             <a:endParaRPr lang="en-US" dirty="0"/>
           </a:p>
@@ -8927,7 +8927,7 @@
           <a:p>
             <a:fld id="{3BDB8791-F1B0-41E7-B7FD-A781E65C4266}" type="datetimeFigureOut">
               <a:rPr lang="en-US" dirty="0"/>
-              <a:t>12/5/2023</a:t>
+              <a:t>12/6/2023</a:t>
             </a:fld>
             <a:endParaRPr lang="en-US" dirty="0"/>
           </a:p>
@@ -9337,7 +9337,7 @@
           <a:p>
             <a:fld id="{5FDD63B2-E120-4ED8-B27B-C685F510A5FE}" type="datetimeFigureOut">
               <a:rPr lang="en-US" dirty="0"/>
-              <a:t>12/5/2023</a:t>
+              <a:t>12/6/2023</a:t>
             </a:fld>
             <a:endParaRPr lang="en-US" dirty="0"/>
           </a:p>
@@ -9464,7 +9464,7 @@
           <a:p>
             <a:fld id="{7AA18ACC-A947-437B-A130-35BD54FDF1E9}" type="datetimeFigureOut">
               <a:rPr lang="en-US" dirty="0"/>
-              <a:t>12/5/2023</a:t>
+              <a:t>12/6/2023</a:t>
             </a:fld>
             <a:endParaRPr lang="en-US" dirty="0"/>
           </a:p>
@@ -9559,7 +9559,7 @@
           <a:p>
             <a:fld id="{7C8D7E02-BCB8-4D50-A234-369438C08659}" type="datetimeFigureOut">
               <a:rPr lang="en-US" dirty="0"/>
-              <a:t>12/5/2023</a:t>
+              <a:t>12/6/2023</a:t>
             </a:fld>
             <a:endParaRPr lang="en-US" dirty="0"/>
           </a:p>
@@ -10640,7 +10640,7 @@
           <a:p>
             <a:fld id="{76E86A4C-8E40-4F87-A4F0-01A0687C5742}" type="datetimeFigureOut">
               <a:rPr lang="en-US" dirty="0"/>
-              <a:t>12/5/2023</a:t>
+              <a:t>12/6/2023</a:t>
             </a:fld>
             <a:endParaRPr lang="en-US" dirty="0"/>
           </a:p>
@@ -11748,7 +11748,7 @@
           <a:p>
             <a:fld id="{35E72C73-2D91-4E12-BA25-F0AA0C03599B}" type="datetimeFigureOut">
               <a:rPr lang="en-US" dirty="0"/>
-              <a:t>12/5/2023</a:t>
+              <a:t>12/6/2023</a:t>
             </a:fld>
             <a:endParaRPr lang="en-US" dirty="0"/>
           </a:p>
@@ -12745,7 +12745,7 @@
           <a:p>
             <a:fld id="{2BE451C3-0FF4-47C4-B829-773ADF60F88C}" type="datetimeFigureOut">
               <a:rPr lang="en-US" dirty="0"/>
-              <a:t>12/5/2023</a:t>
+              <a:t>12/6/2023</a:t>
             </a:fld>
             <a:endParaRPr lang="en-US" dirty="0"/>
           </a:p>
@@ -15142,8 +15142,8 @@
         </p:blipFill>
         <p:spPr>
           <a:xfrm>
-            <a:off x="4419548" y="369276"/>
-            <a:ext cx="4419639" cy="2883044"/>
+            <a:off x="5322419" y="4355304"/>
+            <a:ext cx="2990602" cy="1950846"/>
           </a:xfrm>
           <a:prstGeom prst="rect">
             <a:avLst/>
@@ -15172,68 +15172,8 @@
         </p:blipFill>
         <p:spPr>
           <a:xfrm>
-            <a:off x="8935146" y="402164"/>
-            <a:ext cx="2438473" cy="1197846"/>
-          </a:xfrm>
-          <a:prstGeom prst="rect">
-            <a:avLst/>
-          </a:prstGeom>
-        </p:spPr>
-      </p:pic>
-      <p:pic>
-        <p:nvPicPr>
-          <p:cNvPr id="13" name="Picture 12">
-            <a:extLst>
-              <a:ext uri="{FF2B5EF4-FFF2-40B4-BE49-F238E27FC236}">
-                <a16:creationId xmlns:a16="http://schemas.microsoft.com/office/drawing/2014/main" id="{990DF9A0-96D0-0E30-0DB8-124D29CB710B}"/>
-              </a:ext>
-            </a:extLst>
-          </p:cNvPr>
-          <p:cNvPicPr>
-            <a:picLocks noChangeAspect="1"/>
-          </p:cNvPicPr>
-          <p:nvPr/>
-        </p:nvPicPr>
-        <p:blipFill>
-          <a:blip r:embed="rId4"/>
-          <a:stretch>
-            <a:fillRect/>
-          </a:stretch>
-        </p:blipFill>
-        <p:spPr>
-          <a:xfrm>
-            <a:off x="9146540" y="1661778"/>
-            <a:ext cx="2900159" cy="2330227"/>
-          </a:xfrm>
-          <a:prstGeom prst="rect">
-            <a:avLst/>
-          </a:prstGeom>
-        </p:spPr>
-      </p:pic>
-      <p:pic>
-        <p:nvPicPr>
-          <p:cNvPr id="9" name="Picture 8">
-            <a:extLst>
-              <a:ext uri="{FF2B5EF4-FFF2-40B4-BE49-F238E27FC236}">
-                <a16:creationId xmlns:a16="http://schemas.microsoft.com/office/drawing/2014/main" id="{6C5E6493-B272-1AEF-75F1-50E157CAB497}"/>
-              </a:ext>
-            </a:extLst>
-          </p:cNvPr>
-          <p:cNvPicPr>
-            <a:picLocks noChangeAspect="1"/>
-          </p:cNvPicPr>
-          <p:nvPr/>
-        </p:nvPicPr>
-        <p:blipFill>
-          <a:blip r:embed="rId5"/>
-          <a:stretch>
-            <a:fillRect/>
-          </a:stretch>
-        </p:blipFill>
-        <p:spPr>
-          <a:xfrm>
-            <a:off x="4503617" y="3298439"/>
-            <a:ext cx="2471014" cy="3168478"/>
+            <a:off x="9532805" y="946123"/>
+            <a:ext cx="2105165" cy="871202"/>
           </a:xfrm>
           <a:prstGeom prst="rect">
             <a:avLst/>
@@ -15726,15 +15666,45 @@
           <p:nvPr/>
         </p:nvPicPr>
         <p:blipFill>
-          <a:blip r:embed="rId6"/>
+          <a:blip r:embed="rId4"/>
           <a:stretch>
             <a:fillRect/>
           </a:stretch>
         </p:blipFill>
         <p:spPr>
           <a:xfrm>
-            <a:off x="7057609" y="3292898"/>
+            <a:off x="8555447" y="1980611"/>
             <a:ext cx="2467716" cy="3168478"/>
+          </a:xfrm>
+          <a:prstGeom prst="rect">
+            <a:avLst/>
+          </a:prstGeom>
+        </p:spPr>
+      </p:pic>
+      <p:pic>
+        <p:nvPicPr>
+          <p:cNvPr id="7" name="Picture 6">
+            <a:extLst>
+              <a:ext uri="{FF2B5EF4-FFF2-40B4-BE49-F238E27FC236}">
+                <a16:creationId xmlns:a16="http://schemas.microsoft.com/office/drawing/2014/main" id="{C0751664-B8EE-E314-69A8-DC64D5129A60}"/>
+              </a:ext>
+            </a:extLst>
+          </p:cNvPr>
+          <p:cNvPicPr>
+            <a:picLocks noChangeAspect="1"/>
+          </p:cNvPicPr>
+          <p:nvPr/>
+        </p:nvPicPr>
+        <p:blipFill>
+          <a:blip r:embed="rId5"/>
+          <a:stretch>
+            <a:fillRect/>
+          </a:stretch>
+        </p:blipFill>
+        <p:spPr>
+          <a:xfrm>
+            <a:off x="5676046" y="939442"/>
+            <a:ext cx="2554404" cy="3246654"/>
           </a:xfrm>
           <a:prstGeom prst="rect">
             <a:avLst/>
@@ -15754,8 +15724,8 @@
           <p:nvPr/>
         </p:nvSpPr>
         <p:spPr>
-          <a:xfrm rot="5400000">
-            <a:off x="8650661" y="1723198"/>
+          <a:xfrm rot="20885657">
+            <a:off x="7313332" y="461082"/>
             <a:ext cx="2154266" cy="3058245"/>
           </a:xfrm>
           <a:prstGeom prst="circularArrow">
@@ -15764,7 +15734,7 @@
               <a:gd name="adj2" fmla="val 2845555"/>
               <a:gd name="adj3" fmla="val 20605413"/>
               <a:gd name="adj4" fmla="val 13621479"/>
-              <a:gd name="adj5" fmla="val 6386"/>
+              <a:gd name="adj5" fmla="val 13446"/>
             </a:avLst>
           </a:prstGeom>
         </p:spPr>
@@ -15797,36 +15767,6 @@
           </a:p>
         </p:txBody>
       </p:sp>
-      <p:pic>
-        <p:nvPicPr>
-          <p:cNvPr id="6" name="Picture 5">
-            <a:extLst>
-              <a:ext uri="{FF2B5EF4-FFF2-40B4-BE49-F238E27FC236}">
-                <a16:creationId xmlns:a16="http://schemas.microsoft.com/office/drawing/2014/main" id="{1236982A-BEC2-4D9A-2BE4-584D9379ECAC}"/>
-              </a:ext>
-            </a:extLst>
-          </p:cNvPr>
-          <p:cNvPicPr>
-            <a:picLocks noChangeAspect="1"/>
-          </p:cNvPicPr>
-          <p:nvPr/>
-        </p:nvPicPr>
-        <p:blipFill>
-          <a:blip r:embed="rId7"/>
-          <a:stretch>
-            <a:fillRect/>
-          </a:stretch>
-        </p:blipFill>
-        <p:spPr>
-          <a:xfrm>
-            <a:off x="9839829" y="4703859"/>
-            <a:ext cx="2041266" cy="1512593"/>
-          </a:xfrm>
-          <a:prstGeom prst="rect">
-            <a:avLst/>
-          </a:prstGeom>
-        </p:spPr>
-      </p:pic>
     </p:spTree>
     <p:extLst>
       <p:ext uri="{BB962C8B-B14F-4D97-AF65-F5344CB8AC3E}">

</xml_diff>